<commit_message>
Deploying to gh-pages from @ uprootx/cat-show@e374a8c570897a784400c674159e5fb930831bd1 🚀
</commit_message>
<xml_diff>
--- a/index.pptx
+++ b/index.pptx
@@ -18,23 +18,9 @@
     <p:sldId id="266" r:id="rId12"/>
     <p:sldId id="267" r:id="rId13"/>
     <p:sldId id="268" r:id="rId14"/>
-    <p:sldId id="269" r:id="rId15"/>
-    <p:sldId id="270" r:id="rId16"/>
-    <p:sldId id="271" r:id="rId17"/>
-    <p:sldId id="272" r:id="rId18"/>
-    <p:sldId id="273" r:id="rId19"/>
-    <p:sldId id="274" r:id="rId20"/>
-    <p:sldId id="275" r:id="rId21"/>
-    <p:sldId id="276" r:id="rId22"/>
-    <p:sldId id="277" r:id="rId23"/>
-    <p:sldId id="278" r:id="rId24"/>
-    <p:sldId id="279" r:id="rId25"/>
-    <p:sldId id="280" r:id="rId26"/>
-    <p:sldId id="281" r:id="rId27"/>
-    <p:sldId id="282" r:id="rId28"/>
   </p:sldIdLst>
   <p:notesMasterIdLst>
-    <p:notesMasterId r:id="rId29"/>
+    <p:notesMasterId r:id="rId15"/>
   </p:notesMasterIdLst>
   <p:sldSz cx="12192000" cy="6858000"/>
   <p:notesSz cx="6858000" cy="12192000"/>
@@ -922,7 +908,7 @@
 </p:notes>
 </file>
 
-<file path=ppt/notesSlides/notesSlide14.xml><?xml version="1.0" encoding="utf-8"?>
+<file path=ppt/notesSlides/notesSlide2.xml><?xml version="1.0" encoding="utf-8"?>
 <p:notes xmlns:a="http://schemas.openxmlformats.org/drawingml/2006/main" xmlns:r="http://schemas.openxmlformats.org/officeDocument/2006/relationships" xmlns:p="http://schemas.openxmlformats.org/presentationml/2006/main">
   <p:cSld>
     <p:spTree>
@@ -991,1239 +977,7 @@
           <a:p>
             <a:fld id="{F7021451-1387-4CA6-816F-3879F97B5CBC}" type="slidenum">
               <a:rPr lang="en-US"/>
-              <a:t>14</a:t>
-            </a:fld>
-            <a:endParaRPr lang="en-US"/>
-          </a:p>
-        </p:txBody>
-      </p:sp>
-    </p:spTree>
-    <p:extLst>
-      <p:ext uri="{BB962C8B-B14F-4D97-AF65-F5344CB8AC3E}">
-        <p14:creationId xmlns:p14="http://schemas.microsoft.com/office/powerpoint/2010/main" val="1024086991"/>
-      </p:ext>
-    </p:extLst>
-  </p:cSld>
-  <p:clrMapOvr>
-    <a:masterClrMapping/>
-  </p:clrMapOvr>
-</p:notes>
-</file>
-
-<file path=ppt/notesSlides/notesSlide15.xml><?xml version="1.0" encoding="utf-8"?>
-<p:notes xmlns:a="http://schemas.openxmlformats.org/drawingml/2006/main" xmlns:r="http://schemas.openxmlformats.org/officeDocument/2006/relationships" xmlns:p="http://schemas.openxmlformats.org/presentationml/2006/main">
-  <p:cSld>
-    <p:spTree>
-      <p:nvGrpSpPr>
-        <p:cNvPr id="1" name=""/>
-        <p:cNvGrpSpPr/>
-        <p:nvPr/>
-      </p:nvGrpSpPr>
-      <p:grpSpPr>
-        <a:xfrm>
-          <a:off x="0" y="0"/>
-          <a:ext cx="0" cy="0"/>
-          <a:chOff x="0" y="0"/>
-          <a:chExt cx="0" cy="0"/>
-        </a:xfrm>
-      </p:grpSpPr>
-      <p:sp>
-        <p:nvSpPr>
-          <p:cNvPr id="2" name="Slide Image Placeholder 1"/>
-          <p:cNvSpPr>
-            <a:spLocks noGrp="1" noRot="1" noChangeAspect="1"/>
-          </p:cNvSpPr>
-          <p:nvPr>
-            <p:ph type="sldImg"/>
-          </p:nvPr>
-        </p:nvSpPr>
-        <p:spPr/>
-      </p:sp>
-      <p:sp>
-        <p:nvSpPr>
-          <p:cNvPr id="3" name="Notes Placeholder 2"/>
-          <p:cNvSpPr>
-            <a:spLocks noGrp="1"/>
-          </p:cNvSpPr>
-          <p:nvPr>
-            <p:ph type="body" idx="1"/>
-          </p:nvPr>
-        </p:nvSpPr>
-        <p:spPr/>
-        <p:txBody>
-          <a:bodyPr/>
-          <a:lstStyle/>
-          <a:p>
-            <a:r>
-              <a:rPr lang="en-US" dirty="0"/>
-              <a:t/>
-            </a:r>
-            <a:endParaRPr lang="en-US" dirty="0"/>
-          </a:p>
-        </p:txBody>
-      </p:sp>
-      <p:sp>
-        <p:nvSpPr>
-          <p:cNvPr id="4" name="Slide Number Placeholder 3"/>
-          <p:cNvSpPr>
-            <a:spLocks noGrp="1"/>
-          </p:cNvSpPr>
-          <p:nvPr>
-            <p:ph type="sldNum" sz="quarter" idx="10"/>
-          </p:nvPr>
-        </p:nvSpPr>
-        <p:spPr/>
-        <p:txBody>
-          <a:bodyPr/>
-          <a:lstStyle/>
-          <a:p>
-            <a:fld id="{F7021451-1387-4CA6-816F-3879F97B5CBC}" type="slidenum">
-              <a:rPr lang="en-US"/>
-              <a:t>15</a:t>
-            </a:fld>
-            <a:endParaRPr lang="en-US"/>
-          </a:p>
-        </p:txBody>
-      </p:sp>
-    </p:spTree>
-    <p:extLst>
-      <p:ext uri="{BB962C8B-B14F-4D97-AF65-F5344CB8AC3E}">
-        <p14:creationId xmlns:p14="http://schemas.microsoft.com/office/powerpoint/2010/main" val="1024086991"/>
-      </p:ext>
-    </p:extLst>
-  </p:cSld>
-  <p:clrMapOvr>
-    <a:masterClrMapping/>
-  </p:clrMapOvr>
-</p:notes>
-</file>
-
-<file path=ppt/notesSlides/notesSlide16.xml><?xml version="1.0" encoding="utf-8"?>
-<p:notes xmlns:a="http://schemas.openxmlformats.org/drawingml/2006/main" xmlns:r="http://schemas.openxmlformats.org/officeDocument/2006/relationships" xmlns:p="http://schemas.openxmlformats.org/presentationml/2006/main">
-  <p:cSld>
-    <p:spTree>
-      <p:nvGrpSpPr>
-        <p:cNvPr id="1" name=""/>
-        <p:cNvGrpSpPr/>
-        <p:nvPr/>
-      </p:nvGrpSpPr>
-      <p:grpSpPr>
-        <a:xfrm>
-          <a:off x="0" y="0"/>
-          <a:ext cx="0" cy="0"/>
-          <a:chOff x="0" y="0"/>
-          <a:chExt cx="0" cy="0"/>
-        </a:xfrm>
-      </p:grpSpPr>
-      <p:sp>
-        <p:nvSpPr>
-          <p:cNvPr id="2" name="Slide Image Placeholder 1"/>
-          <p:cNvSpPr>
-            <a:spLocks noGrp="1" noRot="1" noChangeAspect="1"/>
-          </p:cNvSpPr>
-          <p:nvPr>
-            <p:ph type="sldImg"/>
-          </p:nvPr>
-        </p:nvSpPr>
-        <p:spPr/>
-      </p:sp>
-      <p:sp>
-        <p:nvSpPr>
-          <p:cNvPr id="3" name="Notes Placeholder 2"/>
-          <p:cNvSpPr>
-            <a:spLocks noGrp="1"/>
-          </p:cNvSpPr>
-          <p:nvPr>
-            <p:ph type="body" idx="1"/>
-          </p:nvPr>
-        </p:nvSpPr>
-        <p:spPr/>
-        <p:txBody>
-          <a:bodyPr/>
-          <a:lstStyle/>
-          <a:p>
-            <a:r>
-              <a:rPr lang="en-US" dirty="0"/>
-              <a:t/>
-            </a:r>
-            <a:endParaRPr lang="en-US" dirty="0"/>
-          </a:p>
-        </p:txBody>
-      </p:sp>
-      <p:sp>
-        <p:nvSpPr>
-          <p:cNvPr id="4" name="Slide Number Placeholder 3"/>
-          <p:cNvSpPr>
-            <a:spLocks noGrp="1"/>
-          </p:cNvSpPr>
-          <p:nvPr>
-            <p:ph type="sldNum" sz="quarter" idx="10"/>
-          </p:nvPr>
-        </p:nvSpPr>
-        <p:spPr/>
-        <p:txBody>
-          <a:bodyPr/>
-          <a:lstStyle/>
-          <a:p>
-            <a:fld id="{F7021451-1387-4CA6-816F-3879F97B5CBC}" type="slidenum">
-              <a:rPr lang="en-US"/>
-              <a:t>16</a:t>
-            </a:fld>
-            <a:endParaRPr lang="en-US"/>
-          </a:p>
-        </p:txBody>
-      </p:sp>
-    </p:spTree>
-    <p:extLst>
-      <p:ext uri="{BB962C8B-B14F-4D97-AF65-F5344CB8AC3E}">
-        <p14:creationId xmlns:p14="http://schemas.microsoft.com/office/powerpoint/2010/main" val="1024086991"/>
-      </p:ext>
-    </p:extLst>
-  </p:cSld>
-  <p:clrMapOvr>
-    <a:masterClrMapping/>
-  </p:clrMapOvr>
-</p:notes>
-</file>
-
-<file path=ppt/notesSlides/notesSlide17.xml><?xml version="1.0" encoding="utf-8"?>
-<p:notes xmlns:a="http://schemas.openxmlformats.org/drawingml/2006/main" xmlns:r="http://schemas.openxmlformats.org/officeDocument/2006/relationships" xmlns:p="http://schemas.openxmlformats.org/presentationml/2006/main">
-  <p:cSld>
-    <p:spTree>
-      <p:nvGrpSpPr>
-        <p:cNvPr id="1" name=""/>
-        <p:cNvGrpSpPr/>
-        <p:nvPr/>
-      </p:nvGrpSpPr>
-      <p:grpSpPr>
-        <a:xfrm>
-          <a:off x="0" y="0"/>
-          <a:ext cx="0" cy="0"/>
-          <a:chOff x="0" y="0"/>
-          <a:chExt cx="0" cy="0"/>
-        </a:xfrm>
-      </p:grpSpPr>
-      <p:sp>
-        <p:nvSpPr>
-          <p:cNvPr id="2" name="Slide Image Placeholder 1"/>
-          <p:cNvSpPr>
-            <a:spLocks noGrp="1" noRot="1" noChangeAspect="1"/>
-          </p:cNvSpPr>
-          <p:nvPr>
-            <p:ph type="sldImg"/>
-          </p:nvPr>
-        </p:nvSpPr>
-        <p:spPr/>
-      </p:sp>
-      <p:sp>
-        <p:nvSpPr>
-          <p:cNvPr id="3" name="Notes Placeholder 2"/>
-          <p:cNvSpPr>
-            <a:spLocks noGrp="1"/>
-          </p:cNvSpPr>
-          <p:nvPr>
-            <p:ph type="body" idx="1"/>
-          </p:nvPr>
-        </p:nvSpPr>
-        <p:spPr/>
-        <p:txBody>
-          <a:bodyPr/>
-          <a:lstStyle/>
-          <a:p>
-            <a:r>
-              <a:rPr lang="en-US" dirty="0"/>
-              <a:t/>
-            </a:r>
-            <a:endParaRPr lang="en-US" dirty="0"/>
-          </a:p>
-        </p:txBody>
-      </p:sp>
-      <p:sp>
-        <p:nvSpPr>
-          <p:cNvPr id="4" name="Slide Number Placeholder 3"/>
-          <p:cNvSpPr>
-            <a:spLocks noGrp="1"/>
-          </p:cNvSpPr>
-          <p:nvPr>
-            <p:ph type="sldNum" sz="quarter" idx="10"/>
-          </p:nvPr>
-        </p:nvSpPr>
-        <p:spPr/>
-        <p:txBody>
-          <a:bodyPr/>
-          <a:lstStyle/>
-          <a:p>
-            <a:fld id="{F7021451-1387-4CA6-816F-3879F97B5CBC}" type="slidenum">
-              <a:rPr lang="en-US"/>
-              <a:t>17</a:t>
-            </a:fld>
-            <a:endParaRPr lang="en-US"/>
-          </a:p>
-        </p:txBody>
-      </p:sp>
-    </p:spTree>
-    <p:extLst>
-      <p:ext uri="{BB962C8B-B14F-4D97-AF65-F5344CB8AC3E}">
-        <p14:creationId xmlns:p14="http://schemas.microsoft.com/office/powerpoint/2010/main" val="1024086991"/>
-      </p:ext>
-    </p:extLst>
-  </p:cSld>
-  <p:clrMapOvr>
-    <a:masterClrMapping/>
-  </p:clrMapOvr>
-</p:notes>
-</file>
-
-<file path=ppt/notesSlides/notesSlide18.xml><?xml version="1.0" encoding="utf-8"?>
-<p:notes xmlns:a="http://schemas.openxmlformats.org/drawingml/2006/main" xmlns:r="http://schemas.openxmlformats.org/officeDocument/2006/relationships" xmlns:p="http://schemas.openxmlformats.org/presentationml/2006/main">
-  <p:cSld>
-    <p:spTree>
-      <p:nvGrpSpPr>
-        <p:cNvPr id="1" name=""/>
-        <p:cNvGrpSpPr/>
-        <p:nvPr/>
-      </p:nvGrpSpPr>
-      <p:grpSpPr>
-        <a:xfrm>
-          <a:off x="0" y="0"/>
-          <a:ext cx="0" cy="0"/>
-          <a:chOff x="0" y="0"/>
-          <a:chExt cx="0" cy="0"/>
-        </a:xfrm>
-      </p:grpSpPr>
-      <p:sp>
-        <p:nvSpPr>
-          <p:cNvPr id="2" name="Slide Image Placeholder 1"/>
-          <p:cNvSpPr>
-            <a:spLocks noGrp="1" noRot="1" noChangeAspect="1"/>
-          </p:cNvSpPr>
-          <p:nvPr>
-            <p:ph type="sldImg"/>
-          </p:nvPr>
-        </p:nvSpPr>
-        <p:spPr/>
-      </p:sp>
-      <p:sp>
-        <p:nvSpPr>
-          <p:cNvPr id="3" name="Notes Placeholder 2"/>
-          <p:cNvSpPr>
-            <a:spLocks noGrp="1"/>
-          </p:cNvSpPr>
-          <p:nvPr>
-            <p:ph type="body" idx="1"/>
-          </p:nvPr>
-        </p:nvSpPr>
-        <p:spPr/>
-        <p:txBody>
-          <a:bodyPr/>
-          <a:lstStyle/>
-          <a:p>
-            <a:r>
-              <a:rPr lang="en-US" dirty="0"/>
-              <a:t/>
-            </a:r>
-            <a:endParaRPr lang="en-US" dirty="0"/>
-          </a:p>
-        </p:txBody>
-      </p:sp>
-      <p:sp>
-        <p:nvSpPr>
-          <p:cNvPr id="4" name="Slide Number Placeholder 3"/>
-          <p:cNvSpPr>
-            <a:spLocks noGrp="1"/>
-          </p:cNvSpPr>
-          <p:nvPr>
-            <p:ph type="sldNum" sz="quarter" idx="10"/>
-          </p:nvPr>
-        </p:nvSpPr>
-        <p:spPr/>
-        <p:txBody>
-          <a:bodyPr/>
-          <a:lstStyle/>
-          <a:p>
-            <a:fld id="{F7021451-1387-4CA6-816F-3879F97B5CBC}" type="slidenum">
-              <a:rPr lang="en-US"/>
-              <a:t>18</a:t>
-            </a:fld>
-            <a:endParaRPr lang="en-US"/>
-          </a:p>
-        </p:txBody>
-      </p:sp>
-    </p:spTree>
-    <p:extLst>
-      <p:ext uri="{BB962C8B-B14F-4D97-AF65-F5344CB8AC3E}">
-        <p14:creationId xmlns:p14="http://schemas.microsoft.com/office/powerpoint/2010/main" val="1024086991"/>
-      </p:ext>
-    </p:extLst>
-  </p:cSld>
-  <p:clrMapOvr>
-    <a:masterClrMapping/>
-  </p:clrMapOvr>
-</p:notes>
-</file>
-
-<file path=ppt/notesSlides/notesSlide19.xml><?xml version="1.0" encoding="utf-8"?>
-<p:notes xmlns:a="http://schemas.openxmlformats.org/drawingml/2006/main" xmlns:r="http://schemas.openxmlformats.org/officeDocument/2006/relationships" xmlns:p="http://schemas.openxmlformats.org/presentationml/2006/main">
-  <p:cSld>
-    <p:spTree>
-      <p:nvGrpSpPr>
-        <p:cNvPr id="1" name=""/>
-        <p:cNvGrpSpPr/>
-        <p:nvPr/>
-      </p:nvGrpSpPr>
-      <p:grpSpPr>
-        <a:xfrm>
-          <a:off x="0" y="0"/>
-          <a:ext cx="0" cy="0"/>
-          <a:chOff x="0" y="0"/>
-          <a:chExt cx="0" cy="0"/>
-        </a:xfrm>
-      </p:grpSpPr>
-      <p:sp>
-        <p:nvSpPr>
-          <p:cNvPr id="2" name="Slide Image Placeholder 1"/>
-          <p:cNvSpPr>
-            <a:spLocks noGrp="1" noRot="1" noChangeAspect="1"/>
-          </p:cNvSpPr>
-          <p:nvPr>
-            <p:ph type="sldImg"/>
-          </p:nvPr>
-        </p:nvSpPr>
-        <p:spPr/>
-      </p:sp>
-      <p:sp>
-        <p:nvSpPr>
-          <p:cNvPr id="3" name="Notes Placeholder 2"/>
-          <p:cNvSpPr>
-            <a:spLocks noGrp="1"/>
-          </p:cNvSpPr>
-          <p:nvPr>
-            <p:ph type="body" idx="1"/>
-          </p:nvPr>
-        </p:nvSpPr>
-        <p:spPr/>
-        <p:txBody>
-          <a:bodyPr/>
-          <a:lstStyle/>
-          <a:p>
-            <a:r>
-              <a:rPr lang="en-US" dirty="0"/>
-              <a:t/>
-            </a:r>
-            <a:endParaRPr lang="en-US" dirty="0"/>
-          </a:p>
-        </p:txBody>
-      </p:sp>
-      <p:sp>
-        <p:nvSpPr>
-          <p:cNvPr id="4" name="Slide Number Placeholder 3"/>
-          <p:cNvSpPr>
-            <a:spLocks noGrp="1"/>
-          </p:cNvSpPr>
-          <p:nvPr>
-            <p:ph type="sldNum" sz="quarter" idx="10"/>
-          </p:nvPr>
-        </p:nvSpPr>
-        <p:spPr/>
-        <p:txBody>
-          <a:bodyPr/>
-          <a:lstStyle/>
-          <a:p>
-            <a:fld id="{F7021451-1387-4CA6-816F-3879F97B5CBC}" type="slidenum">
-              <a:rPr lang="en-US"/>
-              <a:t>19</a:t>
-            </a:fld>
-            <a:endParaRPr lang="en-US"/>
-          </a:p>
-        </p:txBody>
-      </p:sp>
-    </p:spTree>
-    <p:extLst>
-      <p:ext uri="{BB962C8B-B14F-4D97-AF65-F5344CB8AC3E}">
-        <p14:creationId xmlns:p14="http://schemas.microsoft.com/office/powerpoint/2010/main" val="1024086991"/>
-      </p:ext>
-    </p:extLst>
-  </p:cSld>
-  <p:clrMapOvr>
-    <a:masterClrMapping/>
-  </p:clrMapOvr>
-</p:notes>
-</file>
-
-<file path=ppt/notesSlides/notesSlide2.xml><?xml version="1.0" encoding="utf-8"?>
-<p:notes xmlns:a="http://schemas.openxmlformats.org/drawingml/2006/main" xmlns:r="http://schemas.openxmlformats.org/officeDocument/2006/relationships" xmlns:p="http://schemas.openxmlformats.org/presentationml/2006/main">
-  <p:cSld>
-    <p:spTree>
-      <p:nvGrpSpPr>
-        <p:cNvPr id="1" name=""/>
-        <p:cNvGrpSpPr/>
-        <p:nvPr/>
-      </p:nvGrpSpPr>
-      <p:grpSpPr>
-        <a:xfrm>
-          <a:off x="0" y="0"/>
-          <a:ext cx="0" cy="0"/>
-          <a:chOff x="0" y="0"/>
-          <a:chExt cx="0" cy="0"/>
-        </a:xfrm>
-      </p:grpSpPr>
-      <p:sp>
-        <p:nvSpPr>
-          <p:cNvPr id="2" name="Slide Image Placeholder 1"/>
-          <p:cNvSpPr>
-            <a:spLocks noGrp="1" noRot="1" noChangeAspect="1"/>
-          </p:cNvSpPr>
-          <p:nvPr>
-            <p:ph type="sldImg"/>
-          </p:nvPr>
-        </p:nvSpPr>
-        <p:spPr/>
-      </p:sp>
-      <p:sp>
-        <p:nvSpPr>
-          <p:cNvPr id="3" name="Notes Placeholder 2"/>
-          <p:cNvSpPr>
-            <a:spLocks noGrp="1"/>
-          </p:cNvSpPr>
-          <p:nvPr>
-            <p:ph type="body" idx="1"/>
-          </p:nvPr>
-        </p:nvSpPr>
-        <p:spPr/>
-        <p:txBody>
-          <a:bodyPr/>
-          <a:lstStyle/>
-          <a:p>
-            <a:r>
-              <a:rPr lang="en-US" dirty="0"/>
-              <a:t/>
-            </a:r>
-            <a:endParaRPr lang="en-US" dirty="0"/>
-          </a:p>
-        </p:txBody>
-      </p:sp>
-      <p:sp>
-        <p:nvSpPr>
-          <p:cNvPr id="4" name="Slide Number Placeholder 3"/>
-          <p:cNvSpPr>
-            <a:spLocks noGrp="1"/>
-          </p:cNvSpPr>
-          <p:nvPr>
-            <p:ph type="sldNum" sz="quarter" idx="10"/>
-          </p:nvPr>
-        </p:nvSpPr>
-        <p:spPr/>
-        <p:txBody>
-          <a:bodyPr/>
-          <a:lstStyle/>
-          <a:p>
-            <a:fld id="{F7021451-1387-4CA6-816F-3879F97B5CBC}" type="slidenum">
-              <a:rPr lang="en-US"/>
               <a:t>2</a:t>
-            </a:fld>
-            <a:endParaRPr lang="en-US"/>
-          </a:p>
-        </p:txBody>
-      </p:sp>
-    </p:spTree>
-    <p:extLst>
-      <p:ext uri="{BB962C8B-B14F-4D97-AF65-F5344CB8AC3E}">
-        <p14:creationId xmlns:p14="http://schemas.microsoft.com/office/powerpoint/2010/main" val="1024086991"/>
-      </p:ext>
-    </p:extLst>
-  </p:cSld>
-  <p:clrMapOvr>
-    <a:masterClrMapping/>
-  </p:clrMapOvr>
-</p:notes>
-</file>
-
-<file path=ppt/notesSlides/notesSlide20.xml><?xml version="1.0" encoding="utf-8"?>
-<p:notes xmlns:a="http://schemas.openxmlformats.org/drawingml/2006/main" xmlns:r="http://schemas.openxmlformats.org/officeDocument/2006/relationships" xmlns:p="http://schemas.openxmlformats.org/presentationml/2006/main">
-  <p:cSld>
-    <p:spTree>
-      <p:nvGrpSpPr>
-        <p:cNvPr id="1" name=""/>
-        <p:cNvGrpSpPr/>
-        <p:nvPr/>
-      </p:nvGrpSpPr>
-      <p:grpSpPr>
-        <a:xfrm>
-          <a:off x="0" y="0"/>
-          <a:ext cx="0" cy="0"/>
-          <a:chOff x="0" y="0"/>
-          <a:chExt cx="0" cy="0"/>
-        </a:xfrm>
-      </p:grpSpPr>
-      <p:sp>
-        <p:nvSpPr>
-          <p:cNvPr id="2" name="Slide Image Placeholder 1"/>
-          <p:cNvSpPr>
-            <a:spLocks noGrp="1" noRot="1" noChangeAspect="1"/>
-          </p:cNvSpPr>
-          <p:nvPr>
-            <p:ph type="sldImg"/>
-          </p:nvPr>
-        </p:nvSpPr>
-        <p:spPr/>
-      </p:sp>
-      <p:sp>
-        <p:nvSpPr>
-          <p:cNvPr id="3" name="Notes Placeholder 2"/>
-          <p:cNvSpPr>
-            <a:spLocks noGrp="1"/>
-          </p:cNvSpPr>
-          <p:nvPr>
-            <p:ph type="body" idx="1"/>
-          </p:nvPr>
-        </p:nvSpPr>
-        <p:spPr/>
-        <p:txBody>
-          <a:bodyPr/>
-          <a:lstStyle/>
-          <a:p>
-            <a:r>
-              <a:rPr lang="en-US" dirty="0"/>
-              <a:t/>
-            </a:r>
-            <a:endParaRPr lang="en-US" dirty="0"/>
-          </a:p>
-        </p:txBody>
-      </p:sp>
-      <p:sp>
-        <p:nvSpPr>
-          <p:cNvPr id="4" name="Slide Number Placeholder 3"/>
-          <p:cNvSpPr>
-            <a:spLocks noGrp="1"/>
-          </p:cNvSpPr>
-          <p:nvPr>
-            <p:ph type="sldNum" sz="quarter" idx="10"/>
-          </p:nvPr>
-        </p:nvSpPr>
-        <p:spPr/>
-        <p:txBody>
-          <a:bodyPr/>
-          <a:lstStyle/>
-          <a:p>
-            <a:fld id="{F7021451-1387-4CA6-816F-3879F97B5CBC}" type="slidenum">
-              <a:rPr lang="en-US"/>
-              <a:t>20</a:t>
-            </a:fld>
-            <a:endParaRPr lang="en-US"/>
-          </a:p>
-        </p:txBody>
-      </p:sp>
-    </p:spTree>
-    <p:extLst>
-      <p:ext uri="{BB962C8B-B14F-4D97-AF65-F5344CB8AC3E}">
-        <p14:creationId xmlns:p14="http://schemas.microsoft.com/office/powerpoint/2010/main" val="1024086991"/>
-      </p:ext>
-    </p:extLst>
-  </p:cSld>
-  <p:clrMapOvr>
-    <a:masterClrMapping/>
-  </p:clrMapOvr>
-</p:notes>
-</file>
-
-<file path=ppt/notesSlides/notesSlide21.xml><?xml version="1.0" encoding="utf-8"?>
-<p:notes xmlns:a="http://schemas.openxmlformats.org/drawingml/2006/main" xmlns:r="http://schemas.openxmlformats.org/officeDocument/2006/relationships" xmlns:p="http://schemas.openxmlformats.org/presentationml/2006/main">
-  <p:cSld>
-    <p:spTree>
-      <p:nvGrpSpPr>
-        <p:cNvPr id="1" name=""/>
-        <p:cNvGrpSpPr/>
-        <p:nvPr/>
-      </p:nvGrpSpPr>
-      <p:grpSpPr>
-        <a:xfrm>
-          <a:off x="0" y="0"/>
-          <a:ext cx="0" cy="0"/>
-          <a:chOff x="0" y="0"/>
-          <a:chExt cx="0" cy="0"/>
-        </a:xfrm>
-      </p:grpSpPr>
-      <p:sp>
-        <p:nvSpPr>
-          <p:cNvPr id="2" name="Slide Image Placeholder 1"/>
-          <p:cNvSpPr>
-            <a:spLocks noGrp="1" noRot="1" noChangeAspect="1"/>
-          </p:cNvSpPr>
-          <p:nvPr>
-            <p:ph type="sldImg"/>
-          </p:nvPr>
-        </p:nvSpPr>
-        <p:spPr/>
-      </p:sp>
-      <p:sp>
-        <p:nvSpPr>
-          <p:cNvPr id="3" name="Notes Placeholder 2"/>
-          <p:cNvSpPr>
-            <a:spLocks noGrp="1"/>
-          </p:cNvSpPr>
-          <p:nvPr>
-            <p:ph type="body" idx="1"/>
-          </p:nvPr>
-        </p:nvSpPr>
-        <p:spPr/>
-        <p:txBody>
-          <a:bodyPr/>
-          <a:lstStyle/>
-          <a:p>
-            <a:r>
-              <a:rPr lang="en-US" dirty="0"/>
-              <a:t/>
-            </a:r>
-            <a:endParaRPr lang="en-US" dirty="0"/>
-          </a:p>
-        </p:txBody>
-      </p:sp>
-      <p:sp>
-        <p:nvSpPr>
-          <p:cNvPr id="4" name="Slide Number Placeholder 3"/>
-          <p:cNvSpPr>
-            <a:spLocks noGrp="1"/>
-          </p:cNvSpPr>
-          <p:nvPr>
-            <p:ph type="sldNum" sz="quarter" idx="10"/>
-          </p:nvPr>
-        </p:nvSpPr>
-        <p:spPr/>
-        <p:txBody>
-          <a:bodyPr/>
-          <a:lstStyle/>
-          <a:p>
-            <a:fld id="{F7021451-1387-4CA6-816F-3879F97B5CBC}" type="slidenum">
-              <a:rPr lang="en-US"/>
-              <a:t>21</a:t>
-            </a:fld>
-            <a:endParaRPr lang="en-US"/>
-          </a:p>
-        </p:txBody>
-      </p:sp>
-    </p:spTree>
-    <p:extLst>
-      <p:ext uri="{BB962C8B-B14F-4D97-AF65-F5344CB8AC3E}">
-        <p14:creationId xmlns:p14="http://schemas.microsoft.com/office/powerpoint/2010/main" val="1024086991"/>
-      </p:ext>
-    </p:extLst>
-  </p:cSld>
-  <p:clrMapOvr>
-    <a:masterClrMapping/>
-  </p:clrMapOvr>
-</p:notes>
-</file>
-
-<file path=ppt/notesSlides/notesSlide22.xml><?xml version="1.0" encoding="utf-8"?>
-<p:notes xmlns:a="http://schemas.openxmlformats.org/drawingml/2006/main" xmlns:r="http://schemas.openxmlformats.org/officeDocument/2006/relationships" xmlns:p="http://schemas.openxmlformats.org/presentationml/2006/main">
-  <p:cSld>
-    <p:spTree>
-      <p:nvGrpSpPr>
-        <p:cNvPr id="1" name=""/>
-        <p:cNvGrpSpPr/>
-        <p:nvPr/>
-      </p:nvGrpSpPr>
-      <p:grpSpPr>
-        <a:xfrm>
-          <a:off x="0" y="0"/>
-          <a:ext cx="0" cy="0"/>
-          <a:chOff x="0" y="0"/>
-          <a:chExt cx="0" cy="0"/>
-        </a:xfrm>
-      </p:grpSpPr>
-      <p:sp>
-        <p:nvSpPr>
-          <p:cNvPr id="2" name="Slide Image Placeholder 1"/>
-          <p:cNvSpPr>
-            <a:spLocks noGrp="1" noRot="1" noChangeAspect="1"/>
-          </p:cNvSpPr>
-          <p:nvPr>
-            <p:ph type="sldImg"/>
-          </p:nvPr>
-        </p:nvSpPr>
-        <p:spPr/>
-      </p:sp>
-      <p:sp>
-        <p:nvSpPr>
-          <p:cNvPr id="3" name="Notes Placeholder 2"/>
-          <p:cNvSpPr>
-            <a:spLocks noGrp="1"/>
-          </p:cNvSpPr>
-          <p:nvPr>
-            <p:ph type="body" idx="1"/>
-          </p:nvPr>
-        </p:nvSpPr>
-        <p:spPr/>
-        <p:txBody>
-          <a:bodyPr/>
-          <a:lstStyle/>
-          <a:p>
-            <a:r>
-              <a:rPr lang="en-US" dirty="0"/>
-              <a:t/>
-            </a:r>
-            <a:endParaRPr lang="en-US" dirty="0"/>
-          </a:p>
-        </p:txBody>
-      </p:sp>
-      <p:sp>
-        <p:nvSpPr>
-          <p:cNvPr id="4" name="Slide Number Placeholder 3"/>
-          <p:cNvSpPr>
-            <a:spLocks noGrp="1"/>
-          </p:cNvSpPr>
-          <p:nvPr>
-            <p:ph type="sldNum" sz="quarter" idx="10"/>
-          </p:nvPr>
-        </p:nvSpPr>
-        <p:spPr/>
-        <p:txBody>
-          <a:bodyPr/>
-          <a:lstStyle/>
-          <a:p>
-            <a:fld id="{F7021451-1387-4CA6-816F-3879F97B5CBC}" type="slidenum">
-              <a:rPr lang="en-US"/>
-              <a:t>22</a:t>
-            </a:fld>
-            <a:endParaRPr lang="en-US"/>
-          </a:p>
-        </p:txBody>
-      </p:sp>
-    </p:spTree>
-    <p:extLst>
-      <p:ext uri="{BB962C8B-B14F-4D97-AF65-F5344CB8AC3E}">
-        <p14:creationId xmlns:p14="http://schemas.microsoft.com/office/powerpoint/2010/main" val="1024086991"/>
-      </p:ext>
-    </p:extLst>
-  </p:cSld>
-  <p:clrMapOvr>
-    <a:masterClrMapping/>
-  </p:clrMapOvr>
-</p:notes>
-</file>
-
-<file path=ppt/notesSlides/notesSlide23.xml><?xml version="1.0" encoding="utf-8"?>
-<p:notes xmlns:a="http://schemas.openxmlformats.org/drawingml/2006/main" xmlns:r="http://schemas.openxmlformats.org/officeDocument/2006/relationships" xmlns:p="http://schemas.openxmlformats.org/presentationml/2006/main">
-  <p:cSld>
-    <p:spTree>
-      <p:nvGrpSpPr>
-        <p:cNvPr id="1" name=""/>
-        <p:cNvGrpSpPr/>
-        <p:nvPr/>
-      </p:nvGrpSpPr>
-      <p:grpSpPr>
-        <a:xfrm>
-          <a:off x="0" y="0"/>
-          <a:ext cx="0" cy="0"/>
-          <a:chOff x="0" y="0"/>
-          <a:chExt cx="0" cy="0"/>
-        </a:xfrm>
-      </p:grpSpPr>
-      <p:sp>
-        <p:nvSpPr>
-          <p:cNvPr id="2" name="Slide Image Placeholder 1"/>
-          <p:cNvSpPr>
-            <a:spLocks noGrp="1" noRot="1" noChangeAspect="1"/>
-          </p:cNvSpPr>
-          <p:nvPr>
-            <p:ph type="sldImg"/>
-          </p:nvPr>
-        </p:nvSpPr>
-        <p:spPr/>
-      </p:sp>
-      <p:sp>
-        <p:nvSpPr>
-          <p:cNvPr id="3" name="Notes Placeholder 2"/>
-          <p:cNvSpPr>
-            <a:spLocks noGrp="1"/>
-          </p:cNvSpPr>
-          <p:nvPr>
-            <p:ph type="body" idx="1"/>
-          </p:nvPr>
-        </p:nvSpPr>
-        <p:spPr/>
-        <p:txBody>
-          <a:bodyPr/>
-          <a:lstStyle/>
-          <a:p>
-            <a:r>
-              <a:rPr lang="en-US" dirty="0"/>
-              <a:t/>
-            </a:r>
-            <a:endParaRPr lang="en-US" dirty="0"/>
-          </a:p>
-        </p:txBody>
-      </p:sp>
-      <p:sp>
-        <p:nvSpPr>
-          <p:cNvPr id="4" name="Slide Number Placeholder 3"/>
-          <p:cNvSpPr>
-            <a:spLocks noGrp="1"/>
-          </p:cNvSpPr>
-          <p:nvPr>
-            <p:ph type="sldNum" sz="quarter" idx="10"/>
-          </p:nvPr>
-        </p:nvSpPr>
-        <p:spPr/>
-        <p:txBody>
-          <a:bodyPr/>
-          <a:lstStyle/>
-          <a:p>
-            <a:fld id="{F7021451-1387-4CA6-816F-3879F97B5CBC}" type="slidenum">
-              <a:rPr lang="en-US"/>
-              <a:t>23</a:t>
-            </a:fld>
-            <a:endParaRPr lang="en-US"/>
-          </a:p>
-        </p:txBody>
-      </p:sp>
-    </p:spTree>
-    <p:extLst>
-      <p:ext uri="{BB962C8B-B14F-4D97-AF65-F5344CB8AC3E}">
-        <p14:creationId xmlns:p14="http://schemas.microsoft.com/office/powerpoint/2010/main" val="1024086991"/>
-      </p:ext>
-    </p:extLst>
-  </p:cSld>
-  <p:clrMapOvr>
-    <a:masterClrMapping/>
-  </p:clrMapOvr>
-</p:notes>
-</file>
-
-<file path=ppt/notesSlides/notesSlide24.xml><?xml version="1.0" encoding="utf-8"?>
-<p:notes xmlns:a="http://schemas.openxmlformats.org/drawingml/2006/main" xmlns:r="http://schemas.openxmlformats.org/officeDocument/2006/relationships" xmlns:p="http://schemas.openxmlformats.org/presentationml/2006/main">
-  <p:cSld>
-    <p:spTree>
-      <p:nvGrpSpPr>
-        <p:cNvPr id="1" name=""/>
-        <p:cNvGrpSpPr/>
-        <p:nvPr/>
-      </p:nvGrpSpPr>
-      <p:grpSpPr>
-        <a:xfrm>
-          <a:off x="0" y="0"/>
-          <a:ext cx="0" cy="0"/>
-          <a:chOff x="0" y="0"/>
-          <a:chExt cx="0" cy="0"/>
-        </a:xfrm>
-      </p:grpSpPr>
-      <p:sp>
-        <p:nvSpPr>
-          <p:cNvPr id="2" name="Slide Image Placeholder 1"/>
-          <p:cNvSpPr>
-            <a:spLocks noGrp="1" noRot="1" noChangeAspect="1"/>
-          </p:cNvSpPr>
-          <p:nvPr>
-            <p:ph type="sldImg"/>
-          </p:nvPr>
-        </p:nvSpPr>
-        <p:spPr/>
-      </p:sp>
-      <p:sp>
-        <p:nvSpPr>
-          <p:cNvPr id="3" name="Notes Placeholder 2"/>
-          <p:cNvSpPr>
-            <a:spLocks noGrp="1"/>
-          </p:cNvSpPr>
-          <p:nvPr>
-            <p:ph type="body" idx="1"/>
-          </p:nvPr>
-        </p:nvSpPr>
-        <p:spPr/>
-        <p:txBody>
-          <a:bodyPr/>
-          <a:lstStyle/>
-          <a:p>
-            <a:r>
-              <a:rPr lang="en-US" dirty="0"/>
-              <a:t/>
-            </a:r>
-            <a:endParaRPr lang="en-US" dirty="0"/>
-          </a:p>
-        </p:txBody>
-      </p:sp>
-      <p:sp>
-        <p:nvSpPr>
-          <p:cNvPr id="4" name="Slide Number Placeholder 3"/>
-          <p:cNvSpPr>
-            <a:spLocks noGrp="1"/>
-          </p:cNvSpPr>
-          <p:nvPr>
-            <p:ph type="sldNum" sz="quarter" idx="10"/>
-          </p:nvPr>
-        </p:nvSpPr>
-        <p:spPr/>
-        <p:txBody>
-          <a:bodyPr/>
-          <a:lstStyle/>
-          <a:p>
-            <a:fld id="{F7021451-1387-4CA6-816F-3879F97B5CBC}" type="slidenum">
-              <a:rPr lang="en-US"/>
-              <a:t>24</a:t>
-            </a:fld>
-            <a:endParaRPr lang="en-US"/>
-          </a:p>
-        </p:txBody>
-      </p:sp>
-    </p:spTree>
-    <p:extLst>
-      <p:ext uri="{BB962C8B-B14F-4D97-AF65-F5344CB8AC3E}">
-        <p14:creationId xmlns:p14="http://schemas.microsoft.com/office/powerpoint/2010/main" val="1024086991"/>
-      </p:ext>
-    </p:extLst>
-  </p:cSld>
-  <p:clrMapOvr>
-    <a:masterClrMapping/>
-  </p:clrMapOvr>
-</p:notes>
-</file>
-
-<file path=ppt/notesSlides/notesSlide25.xml><?xml version="1.0" encoding="utf-8"?>
-<p:notes xmlns:a="http://schemas.openxmlformats.org/drawingml/2006/main" xmlns:r="http://schemas.openxmlformats.org/officeDocument/2006/relationships" xmlns:p="http://schemas.openxmlformats.org/presentationml/2006/main">
-  <p:cSld>
-    <p:spTree>
-      <p:nvGrpSpPr>
-        <p:cNvPr id="1" name=""/>
-        <p:cNvGrpSpPr/>
-        <p:nvPr/>
-      </p:nvGrpSpPr>
-      <p:grpSpPr>
-        <a:xfrm>
-          <a:off x="0" y="0"/>
-          <a:ext cx="0" cy="0"/>
-          <a:chOff x="0" y="0"/>
-          <a:chExt cx="0" cy="0"/>
-        </a:xfrm>
-      </p:grpSpPr>
-      <p:sp>
-        <p:nvSpPr>
-          <p:cNvPr id="2" name="Slide Image Placeholder 1"/>
-          <p:cNvSpPr>
-            <a:spLocks noGrp="1" noRot="1" noChangeAspect="1"/>
-          </p:cNvSpPr>
-          <p:nvPr>
-            <p:ph type="sldImg"/>
-          </p:nvPr>
-        </p:nvSpPr>
-        <p:spPr/>
-      </p:sp>
-      <p:sp>
-        <p:nvSpPr>
-          <p:cNvPr id="3" name="Notes Placeholder 2"/>
-          <p:cNvSpPr>
-            <a:spLocks noGrp="1"/>
-          </p:cNvSpPr>
-          <p:nvPr>
-            <p:ph type="body" idx="1"/>
-          </p:nvPr>
-        </p:nvSpPr>
-        <p:spPr/>
-        <p:txBody>
-          <a:bodyPr/>
-          <a:lstStyle/>
-          <a:p>
-            <a:r>
-              <a:rPr lang="en-US" dirty="0"/>
-              <a:t/>
-            </a:r>
-            <a:endParaRPr lang="en-US" dirty="0"/>
-          </a:p>
-        </p:txBody>
-      </p:sp>
-      <p:sp>
-        <p:nvSpPr>
-          <p:cNvPr id="4" name="Slide Number Placeholder 3"/>
-          <p:cNvSpPr>
-            <a:spLocks noGrp="1"/>
-          </p:cNvSpPr>
-          <p:nvPr>
-            <p:ph type="sldNum" sz="quarter" idx="10"/>
-          </p:nvPr>
-        </p:nvSpPr>
-        <p:spPr/>
-        <p:txBody>
-          <a:bodyPr/>
-          <a:lstStyle/>
-          <a:p>
-            <a:fld id="{F7021451-1387-4CA6-816F-3879F97B5CBC}" type="slidenum">
-              <a:rPr lang="en-US"/>
-              <a:t>25</a:t>
-            </a:fld>
-            <a:endParaRPr lang="en-US"/>
-          </a:p>
-        </p:txBody>
-      </p:sp>
-    </p:spTree>
-    <p:extLst>
-      <p:ext uri="{BB962C8B-B14F-4D97-AF65-F5344CB8AC3E}">
-        <p14:creationId xmlns:p14="http://schemas.microsoft.com/office/powerpoint/2010/main" val="1024086991"/>
-      </p:ext>
-    </p:extLst>
-  </p:cSld>
-  <p:clrMapOvr>
-    <a:masterClrMapping/>
-  </p:clrMapOvr>
-</p:notes>
-</file>
-
-<file path=ppt/notesSlides/notesSlide26.xml><?xml version="1.0" encoding="utf-8"?>
-<p:notes xmlns:a="http://schemas.openxmlformats.org/drawingml/2006/main" xmlns:r="http://schemas.openxmlformats.org/officeDocument/2006/relationships" xmlns:p="http://schemas.openxmlformats.org/presentationml/2006/main">
-  <p:cSld>
-    <p:spTree>
-      <p:nvGrpSpPr>
-        <p:cNvPr id="1" name=""/>
-        <p:cNvGrpSpPr/>
-        <p:nvPr/>
-      </p:nvGrpSpPr>
-      <p:grpSpPr>
-        <a:xfrm>
-          <a:off x="0" y="0"/>
-          <a:ext cx="0" cy="0"/>
-          <a:chOff x="0" y="0"/>
-          <a:chExt cx="0" cy="0"/>
-        </a:xfrm>
-      </p:grpSpPr>
-      <p:sp>
-        <p:nvSpPr>
-          <p:cNvPr id="2" name="Slide Image Placeholder 1"/>
-          <p:cNvSpPr>
-            <a:spLocks noGrp="1" noRot="1" noChangeAspect="1"/>
-          </p:cNvSpPr>
-          <p:nvPr>
-            <p:ph type="sldImg"/>
-          </p:nvPr>
-        </p:nvSpPr>
-        <p:spPr/>
-      </p:sp>
-      <p:sp>
-        <p:nvSpPr>
-          <p:cNvPr id="3" name="Notes Placeholder 2"/>
-          <p:cNvSpPr>
-            <a:spLocks noGrp="1"/>
-          </p:cNvSpPr>
-          <p:nvPr>
-            <p:ph type="body" idx="1"/>
-          </p:nvPr>
-        </p:nvSpPr>
-        <p:spPr/>
-        <p:txBody>
-          <a:bodyPr/>
-          <a:lstStyle/>
-          <a:p>
-            <a:r>
-              <a:rPr lang="en-US" dirty="0"/>
-              <a:t/>
-            </a:r>
-            <a:endParaRPr lang="en-US" dirty="0"/>
-          </a:p>
-        </p:txBody>
-      </p:sp>
-      <p:sp>
-        <p:nvSpPr>
-          <p:cNvPr id="4" name="Slide Number Placeholder 3"/>
-          <p:cNvSpPr>
-            <a:spLocks noGrp="1"/>
-          </p:cNvSpPr>
-          <p:nvPr>
-            <p:ph type="sldNum" sz="quarter" idx="10"/>
-          </p:nvPr>
-        </p:nvSpPr>
-        <p:spPr/>
-        <p:txBody>
-          <a:bodyPr/>
-          <a:lstStyle/>
-          <a:p>
-            <a:fld id="{F7021451-1387-4CA6-816F-3879F97B5CBC}" type="slidenum">
-              <a:rPr lang="en-US"/>
-              <a:t>26</a:t>
-            </a:fld>
-            <a:endParaRPr lang="en-US"/>
-          </a:p>
-        </p:txBody>
-      </p:sp>
-    </p:spTree>
-    <p:extLst>
-      <p:ext uri="{BB962C8B-B14F-4D97-AF65-F5344CB8AC3E}">
-        <p14:creationId xmlns:p14="http://schemas.microsoft.com/office/powerpoint/2010/main" val="1024086991"/>
-      </p:ext>
-    </p:extLst>
-  </p:cSld>
-  <p:clrMapOvr>
-    <a:masterClrMapping/>
-  </p:clrMapOvr>
-</p:notes>
-</file>
-
-<file path=ppt/notesSlides/notesSlide27.xml><?xml version="1.0" encoding="utf-8"?>
-<p:notes xmlns:a="http://schemas.openxmlformats.org/drawingml/2006/main" xmlns:r="http://schemas.openxmlformats.org/officeDocument/2006/relationships" xmlns:p="http://schemas.openxmlformats.org/presentationml/2006/main">
-  <p:cSld>
-    <p:spTree>
-      <p:nvGrpSpPr>
-        <p:cNvPr id="1" name=""/>
-        <p:cNvGrpSpPr/>
-        <p:nvPr/>
-      </p:nvGrpSpPr>
-      <p:grpSpPr>
-        <a:xfrm>
-          <a:off x="0" y="0"/>
-          <a:ext cx="0" cy="0"/>
-          <a:chOff x="0" y="0"/>
-          <a:chExt cx="0" cy="0"/>
-        </a:xfrm>
-      </p:grpSpPr>
-      <p:sp>
-        <p:nvSpPr>
-          <p:cNvPr id="2" name="Slide Image Placeholder 1"/>
-          <p:cNvSpPr>
-            <a:spLocks noGrp="1" noRot="1" noChangeAspect="1"/>
-          </p:cNvSpPr>
-          <p:nvPr>
-            <p:ph type="sldImg"/>
-          </p:nvPr>
-        </p:nvSpPr>
-        <p:spPr/>
-      </p:sp>
-      <p:sp>
-        <p:nvSpPr>
-          <p:cNvPr id="3" name="Notes Placeholder 2"/>
-          <p:cNvSpPr>
-            <a:spLocks noGrp="1"/>
-          </p:cNvSpPr>
-          <p:nvPr>
-            <p:ph type="body" idx="1"/>
-          </p:nvPr>
-        </p:nvSpPr>
-        <p:spPr/>
-        <p:txBody>
-          <a:bodyPr/>
-          <a:lstStyle/>
-          <a:p>
-            <a:r>
-              <a:rPr lang="en-US" dirty="0"/>
-              <a:t/>
-            </a:r>
-            <a:endParaRPr lang="en-US" dirty="0"/>
-          </a:p>
-        </p:txBody>
-      </p:sp>
-      <p:sp>
-        <p:nvSpPr>
-          <p:cNvPr id="4" name="Slide Number Placeholder 3"/>
-          <p:cNvSpPr>
-            <a:spLocks noGrp="1"/>
-          </p:cNvSpPr>
-          <p:nvPr>
-            <p:ph type="sldNum" sz="quarter" idx="10"/>
-          </p:nvPr>
-        </p:nvSpPr>
-        <p:spPr/>
-        <p:txBody>
-          <a:bodyPr/>
-          <a:lstStyle/>
-          <a:p>
-            <a:fld id="{F7021451-1387-4CA6-816F-3879F97B5CBC}" type="slidenum">
-              <a:rPr lang="en-US"/>
-              <a:t>27</a:t>
             </a:fld>
             <a:endParaRPr lang="en-US"/>
           </a:p>
@@ -3360,555 +2114,9 @@
 </p:sld>
 </file>
 
-<file path=ppt/slides/slide14.xml><?xml version="1.0" encoding="utf-8"?>
-<p:sld xmlns:a="http://schemas.openxmlformats.org/drawingml/2006/main" xmlns:r="http://schemas.openxmlformats.org/officeDocument/2006/relationships" xmlns:p="http://schemas.openxmlformats.org/presentationml/2006/main">
-  <p:cSld name="Slide 14">
-    <p:bg>
-      <p:bgPr>
-        <a:blipFill dpi="0" rotWithShape="1">
-          <a:blip r:embed="rId1">
-            <a:lum/>
-          </a:blip>
-          <a:srcRect/>
-          <a:stretch>
-            <a:fillRect/>
-          </a:stretch>
-        </a:blipFill>
-        <a:effectLst/>
-      </p:bgPr>
-    </p:bg>
-    <p:spTree>
-      <p:nvGrpSpPr>
-        <p:cNvPr id="1" name=""/>
-        <p:cNvGrpSpPr/>
-        <p:nvPr/>
-      </p:nvGrpSpPr>
-      <p:grpSpPr>
-        <a:xfrm>
-          <a:off x="0" y="0"/>
-          <a:ext cx="0" cy="0"/>
-          <a:chOff x="0" y="0"/>
-          <a:chExt cx="0" cy="0"/>
-        </a:xfrm>
-      </p:grpSpPr>
-    </p:spTree>
-  </p:cSld>
-  <p:clrMapOvr>
-    <a:masterClrMapping/>
-  </p:clrMapOvr>
-</p:sld>
-</file>
-
-<file path=ppt/slides/slide15.xml><?xml version="1.0" encoding="utf-8"?>
-<p:sld xmlns:a="http://schemas.openxmlformats.org/drawingml/2006/main" xmlns:r="http://schemas.openxmlformats.org/officeDocument/2006/relationships" xmlns:p="http://schemas.openxmlformats.org/presentationml/2006/main">
-  <p:cSld name="Slide 15">
-    <p:bg>
-      <p:bgPr>
-        <a:blipFill dpi="0" rotWithShape="1">
-          <a:blip r:embed="rId1">
-            <a:lum/>
-          </a:blip>
-          <a:srcRect/>
-          <a:stretch>
-            <a:fillRect/>
-          </a:stretch>
-        </a:blipFill>
-        <a:effectLst/>
-      </p:bgPr>
-    </p:bg>
-    <p:spTree>
-      <p:nvGrpSpPr>
-        <p:cNvPr id="1" name=""/>
-        <p:cNvGrpSpPr/>
-        <p:nvPr/>
-      </p:nvGrpSpPr>
-      <p:grpSpPr>
-        <a:xfrm>
-          <a:off x="0" y="0"/>
-          <a:ext cx="0" cy="0"/>
-          <a:chOff x="0" y="0"/>
-          <a:chExt cx="0" cy="0"/>
-        </a:xfrm>
-      </p:grpSpPr>
-    </p:spTree>
-  </p:cSld>
-  <p:clrMapOvr>
-    <a:masterClrMapping/>
-  </p:clrMapOvr>
-</p:sld>
-</file>
-
-<file path=ppt/slides/slide16.xml><?xml version="1.0" encoding="utf-8"?>
-<p:sld xmlns:a="http://schemas.openxmlformats.org/drawingml/2006/main" xmlns:r="http://schemas.openxmlformats.org/officeDocument/2006/relationships" xmlns:p="http://schemas.openxmlformats.org/presentationml/2006/main">
-  <p:cSld name="Slide 16">
-    <p:bg>
-      <p:bgPr>
-        <a:blipFill dpi="0" rotWithShape="1">
-          <a:blip r:embed="rId1">
-            <a:lum/>
-          </a:blip>
-          <a:srcRect/>
-          <a:stretch>
-            <a:fillRect/>
-          </a:stretch>
-        </a:blipFill>
-        <a:effectLst/>
-      </p:bgPr>
-    </p:bg>
-    <p:spTree>
-      <p:nvGrpSpPr>
-        <p:cNvPr id="1" name=""/>
-        <p:cNvGrpSpPr/>
-        <p:nvPr/>
-      </p:nvGrpSpPr>
-      <p:grpSpPr>
-        <a:xfrm>
-          <a:off x="0" y="0"/>
-          <a:ext cx="0" cy="0"/>
-          <a:chOff x="0" y="0"/>
-          <a:chExt cx="0" cy="0"/>
-        </a:xfrm>
-      </p:grpSpPr>
-    </p:spTree>
-  </p:cSld>
-  <p:clrMapOvr>
-    <a:masterClrMapping/>
-  </p:clrMapOvr>
-</p:sld>
-</file>
-
-<file path=ppt/slides/slide17.xml><?xml version="1.0" encoding="utf-8"?>
-<p:sld xmlns:a="http://schemas.openxmlformats.org/drawingml/2006/main" xmlns:r="http://schemas.openxmlformats.org/officeDocument/2006/relationships" xmlns:p="http://schemas.openxmlformats.org/presentationml/2006/main">
-  <p:cSld name="Slide 17">
-    <p:bg>
-      <p:bgPr>
-        <a:blipFill dpi="0" rotWithShape="1">
-          <a:blip r:embed="rId1">
-            <a:lum/>
-          </a:blip>
-          <a:srcRect/>
-          <a:stretch>
-            <a:fillRect/>
-          </a:stretch>
-        </a:blipFill>
-        <a:effectLst/>
-      </p:bgPr>
-    </p:bg>
-    <p:spTree>
-      <p:nvGrpSpPr>
-        <p:cNvPr id="1" name=""/>
-        <p:cNvGrpSpPr/>
-        <p:nvPr/>
-      </p:nvGrpSpPr>
-      <p:grpSpPr>
-        <a:xfrm>
-          <a:off x="0" y="0"/>
-          <a:ext cx="0" cy="0"/>
-          <a:chOff x="0" y="0"/>
-          <a:chExt cx="0" cy="0"/>
-        </a:xfrm>
-      </p:grpSpPr>
-    </p:spTree>
-  </p:cSld>
-  <p:clrMapOvr>
-    <a:masterClrMapping/>
-  </p:clrMapOvr>
-</p:sld>
-</file>
-
-<file path=ppt/slides/slide18.xml><?xml version="1.0" encoding="utf-8"?>
-<p:sld xmlns:a="http://schemas.openxmlformats.org/drawingml/2006/main" xmlns:r="http://schemas.openxmlformats.org/officeDocument/2006/relationships" xmlns:p="http://schemas.openxmlformats.org/presentationml/2006/main">
-  <p:cSld name="Slide 18">
-    <p:bg>
-      <p:bgPr>
-        <a:blipFill dpi="0" rotWithShape="1">
-          <a:blip r:embed="rId1">
-            <a:lum/>
-          </a:blip>
-          <a:srcRect/>
-          <a:stretch>
-            <a:fillRect/>
-          </a:stretch>
-        </a:blipFill>
-        <a:effectLst/>
-      </p:bgPr>
-    </p:bg>
-    <p:spTree>
-      <p:nvGrpSpPr>
-        <p:cNvPr id="1" name=""/>
-        <p:cNvGrpSpPr/>
-        <p:nvPr/>
-      </p:nvGrpSpPr>
-      <p:grpSpPr>
-        <a:xfrm>
-          <a:off x="0" y="0"/>
-          <a:ext cx="0" cy="0"/>
-          <a:chOff x="0" y="0"/>
-          <a:chExt cx="0" cy="0"/>
-        </a:xfrm>
-      </p:grpSpPr>
-    </p:spTree>
-  </p:cSld>
-  <p:clrMapOvr>
-    <a:masterClrMapping/>
-  </p:clrMapOvr>
-</p:sld>
-</file>
-
-<file path=ppt/slides/slide19.xml><?xml version="1.0" encoding="utf-8"?>
-<p:sld xmlns:a="http://schemas.openxmlformats.org/drawingml/2006/main" xmlns:r="http://schemas.openxmlformats.org/officeDocument/2006/relationships" xmlns:p="http://schemas.openxmlformats.org/presentationml/2006/main">
-  <p:cSld name="Slide 19">
-    <p:bg>
-      <p:bgPr>
-        <a:blipFill dpi="0" rotWithShape="1">
-          <a:blip r:embed="rId1">
-            <a:lum/>
-          </a:blip>
-          <a:srcRect/>
-          <a:stretch>
-            <a:fillRect/>
-          </a:stretch>
-        </a:blipFill>
-        <a:effectLst/>
-      </p:bgPr>
-    </p:bg>
-    <p:spTree>
-      <p:nvGrpSpPr>
-        <p:cNvPr id="1" name=""/>
-        <p:cNvGrpSpPr/>
-        <p:nvPr/>
-      </p:nvGrpSpPr>
-      <p:grpSpPr>
-        <a:xfrm>
-          <a:off x="0" y="0"/>
-          <a:ext cx="0" cy="0"/>
-          <a:chOff x="0" y="0"/>
-          <a:chExt cx="0" cy="0"/>
-        </a:xfrm>
-      </p:grpSpPr>
-    </p:spTree>
-  </p:cSld>
-  <p:clrMapOvr>
-    <a:masterClrMapping/>
-  </p:clrMapOvr>
-</p:sld>
-</file>
-
 <file path=ppt/slides/slide2.xml><?xml version="1.0" encoding="utf-8"?>
 <p:sld xmlns:a="http://schemas.openxmlformats.org/drawingml/2006/main" xmlns:r="http://schemas.openxmlformats.org/officeDocument/2006/relationships" xmlns:p="http://schemas.openxmlformats.org/presentationml/2006/main">
   <p:cSld name="Slide 2">
-    <p:bg>
-      <p:bgPr>
-        <a:blipFill dpi="0" rotWithShape="1">
-          <a:blip r:embed="rId1">
-            <a:lum/>
-          </a:blip>
-          <a:srcRect/>
-          <a:stretch>
-            <a:fillRect/>
-          </a:stretch>
-        </a:blipFill>
-        <a:effectLst/>
-      </p:bgPr>
-    </p:bg>
-    <p:spTree>
-      <p:nvGrpSpPr>
-        <p:cNvPr id="1" name=""/>
-        <p:cNvGrpSpPr/>
-        <p:nvPr/>
-      </p:nvGrpSpPr>
-      <p:grpSpPr>
-        <a:xfrm>
-          <a:off x="0" y="0"/>
-          <a:ext cx="0" cy="0"/>
-          <a:chOff x="0" y="0"/>
-          <a:chExt cx="0" cy="0"/>
-        </a:xfrm>
-      </p:grpSpPr>
-    </p:spTree>
-  </p:cSld>
-  <p:clrMapOvr>
-    <a:masterClrMapping/>
-  </p:clrMapOvr>
-</p:sld>
-</file>
-
-<file path=ppt/slides/slide20.xml><?xml version="1.0" encoding="utf-8"?>
-<p:sld xmlns:a="http://schemas.openxmlformats.org/drawingml/2006/main" xmlns:r="http://schemas.openxmlformats.org/officeDocument/2006/relationships" xmlns:p="http://schemas.openxmlformats.org/presentationml/2006/main">
-  <p:cSld name="Slide 20">
-    <p:bg>
-      <p:bgPr>
-        <a:blipFill dpi="0" rotWithShape="1">
-          <a:blip r:embed="rId1">
-            <a:lum/>
-          </a:blip>
-          <a:srcRect/>
-          <a:stretch>
-            <a:fillRect/>
-          </a:stretch>
-        </a:blipFill>
-        <a:effectLst/>
-      </p:bgPr>
-    </p:bg>
-    <p:spTree>
-      <p:nvGrpSpPr>
-        <p:cNvPr id="1" name=""/>
-        <p:cNvGrpSpPr/>
-        <p:nvPr/>
-      </p:nvGrpSpPr>
-      <p:grpSpPr>
-        <a:xfrm>
-          <a:off x="0" y="0"/>
-          <a:ext cx="0" cy="0"/>
-          <a:chOff x="0" y="0"/>
-          <a:chExt cx="0" cy="0"/>
-        </a:xfrm>
-      </p:grpSpPr>
-    </p:spTree>
-  </p:cSld>
-  <p:clrMapOvr>
-    <a:masterClrMapping/>
-  </p:clrMapOvr>
-</p:sld>
-</file>
-
-<file path=ppt/slides/slide21.xml><?xml version="1.0" encoding="utf-8"?>
-<p:sld xmlns:a="http://schemas.openxmlformats.org/drawingml/2006/main" xmlns:r="http://schemas.openxmlformats.org/officeDocument/2006/relationships" xmlns:p="http://schemas.openxmlformats.org/presentationml/2006/main">
-  <p:cSld name="Slide 21">
-    <p:bg>
-      <p:bgPr>
-        <a:blipFill dpi="0" rotWithShape="1">
-          <a:blip r:embed="rId1">
-            <a:lum/>
-          </a:blip>
-          <a:srcRect/>
-          <a:stretch>
-            <a:fillRect/>
-          </a:stretch>
-        </a:blipFill>
-        <a:effectLst/>
-      </p:bgPr>
-    </p:bg>
-    <p:spTree>
-      <p:nvGrpSpPr>
-        <p:cNvPr id="1" name=""/>
-        <p:cNvGrpSpPr/>
-        <p:nvPr/>
-      </p:nvGrpSpPr>
-      <p:grpSpPr>
-        <a:xfrm>
-          <a:off x="0" y="0"/>
-          <a:ext cx="0" cy="0"/>
-          <a:chOff x="0" y="0"/>
-          <a:chExt cx="0" cy="0"/>
-        </a:xfrm>
-      </p:grpSpPr>
-    </p:spTree>
-  </p:cSld>
-  <p:clrMapOvr>
-    <a:masterClrMapping/>
-  </p:clrMapOvr>
-</p:sld>
-</file>
-
-<file path=ppt/slides/slide22.xml><?xml version="1.0" encoding="utf-8"?>
-<p:sld xmlns:a="http://schemas.openxmlformats.org/drawingml/2006/main" xmlns:r="http://schemas.openxmlformats.org/officeDocument/2006/relationships" xmlns:p="http://schemas.openxmlformats.org/presentationml/2006/main">
-  <p:cSld name="Slide 22">
-    <p:bg>
-      <p:bgPr>
-        <a:blipFill dpi="0" rotWithShape="1">
-          <a:blip r:embed="rId1">
-            <a:lum/>
-          </a:blip>
-          <a:srcRect/>
-          <a:stretch>
-            <a:fillRect/>
-          </a:stretch>
-        </a:blipFill>
-        <a:effectLst/>
-      </p:bgPr>
-    </p:bg>
-    <p:spTree>
-      <p:nvGrpSpPr>
-        <p:cNvPr id="1" name=""/>
-        <p:cNvGrpSpPr/>
-        <p:nvPr/>
-      </p:nvGrpSpPr>
-      <p:grpSpPr>
-        <a:xfrm>
-          <a:off x="0" y="0"/>
-          <a:ext cx="0" cy="0"/>
-          <a:chOff x="0" y="0"/>
-          <a:chExt cx="0" cy="0"/>
-        </a:xfrm>
-      </p:grpSpPr>
-    </p:spTree>
-  </p:cSld>
-  <p:clrMapOvr>
-    <a:masterClrMapping/>
-  </p:clrMapOvr>
-</p:sld>
-</file>
-
-<file path=ppt/slides/slide23.xml><?xml version="1.0" encoding="utf-8"?>
-<p:sld xmlns:a="http://schemas.openxmlformats.org/drawingml/2006/main" xmlns:r="http://schemas.openxmlformats.org/officeDocument/2006/relationships" xmlns:p="http://schemas.openxmlformats.org/presentationml/2006/main">
-  <p:cSld name="Slide 23">
-    <p:bg>
-      <p:bgPr>
-        <a:blipFill dpi="0" rotWithShape="1">
-          <a:blip r:embed="rId1">
-            <a:lum/>
-          </a:blip>
-          <a:srcRect/>
-          <a:stretch>
-            <a:fillRect/>
-          </a:stretch>
-        </a:blipFill>
-        <a:effectLst/>
-      </p:bgPr>
-    </p:bg>
-    <p:spTree>
-      <p:nvGrpSpPr>
-        <p:cNvPr id="1" name=""/>
-        <p:cNvGrpSpPr/>
-        <p:nvPr/>
-      </p:nvGrpSpPr>
-      <p:grpSpPr>
-        <a:xfrm>
-          <a:off x="0" y="0"/>
-          <a:ext cx="0" cy="0"/>
-          <a:chOff x="0" y="0"/>
-          <a:chExt cx="0" cy="0"/>
-        </a:xfrm>
-      </p:grpSpPr>
-    </p:spTree>
-  </p:cSld>
-  <p:clrMapOvr>
-    <a:masterClrMapping/>
-  </p:clrMapOvr>
-</p:sld>
-</file>
-
-<file path=ppt/slides/slide24.xml><?xml version="1.0" encoding="utf-8"?>
-<p:sld xmlns:a="http://schemas.openxmlformats.org/drawingml/2006/main" xmlns:r="http://schemas.openxmlformats.org/officeDocument/2006/relationships" xmlns:p="http://schemas.openxmlformats.org/presentationml/2006/main">
-  <p:cSld name="Slide 24">
-    <p:bg>
-      <p:bgPr>
-        <a:blipFill dpi="0" rotWithShape="1">
-          <a:blip r:embed="rId1">
-            <a:lum/>
-          </a:blip>
-          <a:srcRect/>
-          <a:stretch>
-            <a:fillRect/>
-          </a:stretch>
-        </a:blipFill>
-        <a:effectLst/>
-      </p:bgPr>
-    </p:bg>
-    <p:spTree>
-      <p:nvGrpSpPr>
-        <p:cNvPr id="1" name=""/>
-        <p:cNvGrpSpPr/>
-        <p:nvPr/>
-      </p:nvGrpSpPr>
-      <p:grpSpPr>
-        <a:xfrm>
-          <a:off x="0" y="0"/>
-          <a:ext cx="0" cy="0"/>
-          <a:chOff x="0" y="0"/>
-          <a:chExt cx="0" cy="0"/>
-        </a:xfrm>
-      </p:grpSpPr>
-    </p:spTree>
-  </p:cSld>
-  <p:clrMapOvr>
-    <a:masterClrMapping/>
-  </p:clrMapOvr>
-</p:sld>
-</file>
-
-<file path=ppt/slides/slide25.xml><?xml version="1.0" encoding="utf-8"?>
-<p:sld xmlns:a="http://schemas.openxmlformats.org/drawingml/2006/main" xmlns:r="http://schemas.openxmlformats.org/officeDocument/2006/relationships" xmlns:p="http://schemas.openxmlformats.org/presentationml/2006/main">
-  <p:cSld name="Slide 25">
-    <p:bg>
-      <p:bgPr>
-        <a:blipFill dpi="0" rotWithShape="1">
-          <a:blip r:embed="rId1">
-            <a:lum/>
-          </a:blip>
-          <a:srcRect/>
-          <a:stretch>
-            <a:fillRect/>
-          </a:stretch>
-        </a:blipFill>
-        <a:effectLst/>
-      </p:bgPr>
-    </p:bg>
-    <p:spTree>
-      <p:nvGrpSpPr>
-        <p:cNvPr id="1" name=""/>
-        <p:cNvGrpSpPr/>
-        <p:nvPr/>
-      </p:nvGrpSpPr>
-      <p:grpSpPr>
-        <a:xfrm>
-          <a:off x="0" y="0"/>
-          <a:ext cx="0" cy="0"/>
-          <a:chOff x="0" y="0"/>
-          <a:chExt cx="0" cy="0"/>
-        </a:xfrm>
-      </p:grpSpPr>
-    </p:spTree>
-  </p:cSld>
-  <p:clrMapOvr>
-    <a:masterClrMapping/>
-  </p:clrMapOvr>
-</p:sld>
-</file>
-
-<file path=ppt/slides/slide26.xml><?xml version="1.0" encoding="utf-8"?>
-<p:sld xmlns:a="http://schemas.openxmlformats.org/drawingml/2006/main" xmlns:r="http://schemas.openxmlformats.org/officeDocument/2006/relationships" xmlns:p="http://schemas.openxmlformats.org/presentationml/2006/main">
-  <p:cSld name="Slide 26">
-    <p:bg>
-      <p:bgPr>
-        <a:blipFill dpi="0" rotWithShape="1">
-          <a:blip r:embed="rId1">
-            <a:lum/>
-          </a:blip>
-          <a:srcRect/>
-          <a:stretch>
-            <a:fillRect/>
-          </a:stretch>
-        </a:blipFill>
-        <a:effectLst/>
-      </p:bgPr>
-    </p:bg>
-    <p:spTree>
-      <p:nvGrpSpPr>
-        <p:cNvPr id="1" name=""/>
-        <p:cNvGrpSpPr/>
-        <p:nvPr/>
-      </p:nvGrpSpPr>
-      <p:grpSpPr>
-        <a:xfrm>
-          <a:off x="0" y="0"/>
-          <a:ext cx="0" cy="0"/>
-          <a:chOff x="0" y="0"/>
-          <a:chExt cx="0" cy="0"/>
-        </a:xfrm>
-      </p:grpSpPr>
-    </p:spTree>
-  </p:cSld>
-  <p:clrMapOvr>
-    <a:masterClrMapping/>
-  </p:clrMapOvr>
-</p:sld>
-</file>
-
-<file path=ppt/slides/slide27.xml><?xml version="1.0" encoding="utf-8"?>
-<p:sld xmlns:a="http://schemas.openxmlformats.org/drawingml/2006/main" xmlns:r="http://schemas.openxmlformats.org/officeDocument/2006/relationships" xmlns:p="http://schemas.openxmlformats.org/presentationml/2006/main">
-  <p:cSld name="Slide 27">
     <p:bg>
       <p:bgPr>
         <a:blipFill dpi="0" rotWithShape="1">

</xml_diff>